<commit_message>
Adding to weekly powerpoint
</commit_message>
<xml_diff>
--- a/weekly_meetings/09092022_Presentation.pptx
+++ b/weekly_meetings/09092022_Presentation.pptx
@@ -10,6 +10,9 @@
     <p:sldId id="258" r:id="rId4"/>
     <p:sldId id="261" r:id="rId5"/>
     <p:sldId id="262" r:id="rId6"/>
+    <p:sldId id="263" r:id="rId7"/>
+    <p:sldId id="264" r:id="rId8"/>
+    <p:sldId id="266" r:id="rId9"/>
   </p:sldIdLst>
   <p:sldSz cx="12192000" cy="6858000"/>
   <p:notesSz cx="6858000" cy="9144000"/>
@@ -286,7 +289,7 @@
           <a:p>
             <a:fld id="{E44F3716-7E2A-144C-BF83-BF0124CABBAB}" type="datetimeFigureOut">
               <a:rPr lang="en-US" smtClean="0"/>
-              <a:t>9/4/22</a:t>
+              <a:t>9/7/22</a:t>
             </a:fld>
             <a:endParaRPr lang="en-US"/>
           </a:p>
@@ -553,7 +556,7 @@
           <a:p>
             <a:fld id="{E44F3716-7E2A-144C-BF83-BF0124CABBAB}" type="datetimeFigureOut">
               <a:rPr lang="en-US" smtClean="0"/>
-              <a:t>9/4/22</a:t>
+              <a:t>9/7/22</a:t>
             </a:fld>
             <a:endParaRPr lang="en-US"/>
           </a:p>
@@ -784,7 +787,7 @@
           <a:p>
             <a:fld id="{E44F3716-7E2A-144C-BF83-BF0124CABBAB}" type="datetimeFigureOut">
               <a:rPr lang="en-US" smtClean="0"/>
-              <a:t>9/4/22</a:t>
+              <a:t>9/7/22</a:t>
             </a:fld>
             <a:endParaRPr lang="en-US"/>
           </a:p>
@@ -1094,7 +1097,7 @@
           <a:p>
             <a:fld id="{E44F3716-7E2A-144C-BF83-BF0124CABBAB}" type="datetimeFigureOut">
               <a:rPr lang="en-US" smtClean="0"/>
-              <a:t>9/4/22</a:t>
+              <a:t>9/7/22</a:t>
             </a:fld>
             <a:endParaRPr lang="en-US"/>
           </a:p>
@@ -1567,7 +1570,7 @@
           <a:p>
             <a:fld id="{E44F3716-7E2A-144C-BF83-BF0124CABBAB}" type="datetimeFigureOut">
               <a:rPr lang="en-US" smtClean="0"/>
-              <a:t>9/4/22</a:t>
+              <a:t>9/7/22</a:t>
             </a:fld>
             <a:endParaRPr lang="en-US"/>
           </a:p>
@@ -2114,7 +2117,7 @@
           <a:p>
             <a:fld id="{E44F3716-7E2A-144C-BF83-BF0124CABBAB}" type="datetimeFigureOut">
               <a:rPr lang="en-US" smtClean="0"/>
-              <a:t>9/4/22</a:t>
+              <a:t>9/7/22</a:t>
             </a:fld>
             <a:endParaRPr lang="en-US"/>
           </a:p>
@@ -2888,7 +2891,7 @@
           <a:p>
             <a:fld id="{E44F3716-7E2A-144C-BF83-BF0124CABBAB}" type="datetimeFigureOut">
               <a:rPr lang="en-US" smtClean="0"/>
-              <a:t>9/4/22</a:t>
+              <a:t>9/7/22</a:t>
             </a:fld>
             <a:endParaRPr lang="en-US"/>
           </a:p>
@@ -3063,7 +3066,7 @@
           <a:p>
             <a:fld id="{E44F3716-7E2A-144C-BF83-BF0124CABBAB}" type="datetimeFigureOut">
               <a:rPr lang="en-US" smtClean="0"/>
-              <a:t>9/4/22</a:t>
+              <a:t>9/7/22</a:t>
             </a:fld>
             <a:endParaRPr lang="en-US"/>
           </a:p>
@@ -3286,7 +3289,7 @@
           <a:p>
             <a:fld id="{E44F3716-7E2A-144C-BF83-BF0124CABBAB}" type="datetimeFigureOut">
               <a:rPr lang="en-US" smtClean="0"/>
-              <a:t>9/4/22</a:t>
+              <a:t>9/7/22</a:t>
             </a:fld>
             <a:endParaRPr lang="en-US"/>
           </a:p>
@@ -3466,7 +3469,7 @@
           <a:p>
             <a:fld id="{E44F3716-7E2A-144C-BF83-BF0124CABBAB}" type="datetimeFigureOut">
               <a:rPr lang="en-US" smtClean="0"/>
-              <a:t>9/4/22</a:t>
+              <a:t>9/7/22</a:t>
             </a:fld>
             <a:endParaRPr lang="en-US"/>
           </a:p>
@@ -3755,7 +3758,7 @@
           <a:p>
             <a:fld id="{E44F3716-7E2A-144C-BF83-BF0124CABBAB}" type="datetimeFigureOut">
               <a:rPr lang="en-US" smtClean="0"/>
-              <a:t>9/4/22</a:t>
+              <a:t>9/7/22</a:t>
             </a:fld>
             <a:endParaRPr lang="en-US"/>
           </a:p>
@@ -3997,7 +4000,7 @@
           <a:p>
             <a:fld id="{E44F3716-7E2A-144C-BF83-BF0124CABBAB}" type="datetimeFigureOut">
               <a:rPr lang="en-US" smtClean="0"/>
-              <a:t>9/4/22</a:t>
+              <a:t>9/7/22</a:t>
             </a:fld>
             <a:endParaRPr lang="en-US"/>
           </a:p>
@@ -4376,7 +4379,7 @@
           <a:p>
             <a:fld id="{E44F3716-7E2A-144C-BF83-BF0124CABBAB}" type="datetimeFigureOut">
               <a:rPr lang="en-US" smtClean="0"/>
-              <a:t>9/4/22</a:t>
+              <a:t>9/7/22</a:t>
             </a:fld>
             <a:endParaRPr lang="en-US"/>
           </a:p>
@@ -4494,7 +4497,7 @@
           <a:p>
             <a:fld id="{E44F3716-7E2A-144C-BF83-BF0124CABBAB}" type="datetimeFigureOut">
               <a:rPr lang="en-US" smtClean="0"/>
-              <a:t>9/4/22</a:t>
+              <a:t>9/7/22</a:t>
             </a:fld>
             <a:endParaRPr lang="en-US"/>
           </a:p>
@@ -4589,7 +4592,7 @@
           <a:p>
             <a:fld id="{E44F3716-7E2A-144C-BF83-BF0124CABBAB}" type="datetimeFigureOut">
               <a:rPr lang="en-US" smtClean="0"/>
-              <a:t>9/4/22</a:t>
+              <a:t>9/7/22</a:t>
             </a:fld>
             <a:endParaRPr lang="en-US"/>
           </a:p>
@@ -4838,7 +4841,7 @@
           <a:p>
             <a:fld id="{E44F3716-7E2A-144C-BF83-BF0124CABBAB}" type="datetimeFigureOut">
               <a:rPr lang="en-US" smtClean="0"/>
-              <a:t>9/4/22</a:t>
+              <a:t>9/7/22</a:t>
             </a:fld>
             <a:endParaRPr lang="en-US"/>
           </a:p>
@@ -5095,7 +5098,7 @@
           <a:p>
             <a:fld id="{E44F3716-7E2A-144C-BF83-BF0124CABBAB}" type="datetimeFigureOut">
               <a:rPr lang="en-US" smtClean="0"/>
-              <a:t>9/4/22</a:t>
+              <a:t>9/7/22</a:t>
             </a:fld>
             <a:endParaRPr lang="en-US"/>
           </a:p>
@@ -5338,7 +5341,7 @@
           <a:p>
             <a:fld id="{E44F3716-7E2A-144C-BF83-BF0124CABBAB}" type="datetimeFigureOut">
               <a:rPr lang="en-US" smtClean="0"/>
-              <a:t>9/4/22</a:t>
+              <a:t>9/7/22</a:t>
             </a:fld>
             <a:endParaRPr lang="en-US"/>
           </a:p>
@@ -5993,9 +5996,10 @@
               <a:t>Balbi</a:t>
             </a:r>
             <a:r>
-              <a:rPr lang="en-US" dirty="0"/>
-              <a:t> paper if Dr. Kochanski wants me to</a:t>
-            </a:r>
+              <a:rPr lang="en-US"/>
+              <a:t> paper</a:t>
+            </a:r>
+            <a:endParaRPr lang="en-US" dirty="0"/>
           </a:p>
           <a:p>
             <a:r>
@@ -6648,6 +6652,448 @@
     <p:extLst>
       <p:ext uri="{BB962C8B-B14F-4D97-AF65-F5344CB8AC3E}">
         <p14:creationId xmlns:p14="http://schemas.microsoft.com/office/powerpoint/2010/main" val="1575160991"/>
+      </p:ext>
+    </p:extLst>
+  </p:cSld>
+  <p:clrMapOvr>
+    <a:masterClrMapping/>
+  </p:clrMapOvr>
+</p:sld>
+</file>
+
+<file path=ppt/slides/slide6.xml><?xml version="1.0" encoding="utf-8"?>
+<p:sld xmlns:a="http://schemas.openxmlformats.org/drawingml/2006/main" xmlns:r="http://schemas.openxmlformats.org/officeDocument/2006/relationships" xmlns:p="http://schemas.openxmlformats.org/presentationml/2006/main">
+  <p:cSld>
+    <p:spTree>
+      <p:nvGrpSpPr>
+        <p:cNvPr id="1" name=""/>
+        <p:cNvGrpSpPr/>
+        <p:nvPr/>
+      </p:nvGrpSpPr>
+      <p:grpSpPr>
+        <a:xfrm>
+          <a:off x="0" y="0"/>
+          <a:ext cx="0" cy="0"/>
+          <a:chOff x="0" y="0"/>
+          <a:chExt cx="0" cy="0"/>
+        </a:xfrm>
+      </p:grpSpPr>
+      <p:sp>
+        <p:nvSpPr>
+          <p:cNvPr id="2" name="Title 1">
+            <a:extLst>
+              <a:ext uri="{FF2B5EF4-FFF2-40B4-BE49-F238E27FC236}">
+                <a16:creationId xmlns:a16="http://schemas.microsoft.com/office/drawing/2014/main" id="{E5122D9F-C496-43EA-706A-26D1E93BF485}"/>
+              </a:ext>
+            </a:extLst>
+          </p:cNvPr>
+          <p:cNvSpPr>
+            <a:spLocks noGrp="1"/>
+          </p:cNvSpPr>
+          <p:nvPr>
+            <p:ph type="title"/>
+          </p:nvPr>
+        </p:nvSpPr>
+        <p:spPr/>
+        <p:txBody>
+          <a:bodyPr/>
+          <a:lstStyle/>
+          <a:p>
+            <a:r>
+              <a:rPr lang="en-US" dirty="0"/>
+              <a:t>Smoothing out sodar data</a:t>
+            </a:r>
+          </a:p>
+        </p:txBody>
+      </p:sp>
+      <p:sp>
+        <p:nvSpPr>
+          <p:cNvPr id="3" name="Content Placeholder 2">
+            <a:extLst>
+              <a:ext uri="{FF2B5EF4-FFF2-40B4-BE49-F238E27FC236}">
+                <a16:creationId xmlns:a16="http://schemas.microsoft.com/office/drawing/2014/main" id="{B7ABC8AB-0C69-4369-EEED-39D029213767}"/>
+              </a:ext>
+            </a:extLst>
+          </p:cNvPr>
+          <p:cNvSpPr>
+            <a:spLocks noGrp="1"/>
+          </p:cNvSpPr>
+          <p:nvPr>
+            <p:ph idx="1"/>
+          </p:nvPr>
+        </p:nvSpPr>
+        <p:spPr/>
+        <p:txBody>
+          <a:bodyPr/>
+          <a:lstStyle/>
+          <a:p>
+            <a:r>
+              <a:rPr lang="en-US" dirty="0"/>
+              <a:t>In the </a:t>
+            </a:r>
+            <a:r>
+              <a:rPr lang="en-US" dirty="0" err="1"/>
+              <a:t>input_sounding</a:t>
+            </a:r>
+            <a:r>
+              <a:rPr lang="en-US" dirty="0"/>
+              <a:t>, the SODAR data had a few rough spots where the wind speeds changed rapidly with height</a:t>
+            </a:r>
+          </a:p>
+        </p:txBody>
+      </p:sp>
+      <p:pic>
+        <p:nvPicPr>
+          <p:cNvPr id="1026" name="Picture 2">
+            <a:extLst>
+              <a:ext uri="{FF2B5EF4-FFF2-40B4-BE49-F238E27FC236}">
+                <a16:creationId xmlns:a16="http://schemas.microsoft.com/office/drawing/2014/main" id="{6AF30601-0D67-61AB-F2B6-24F536F10D89}"/>
+              </a:ext>
+            </a:extLst>
+          </p:cNvPr>
+          <p:cNvPicPr>
+            <a:picLocks noChangeAspect="1" noChangeArrowheads="1"/>
+          </p:cNvPicPr>
+          <p:nvPr/>
+        </p:nvPicPr>
+        <p:blipFill>
+          <a:blip r:embed="rId2">
+            <a:extLst>
+              <a:ext uri="{28A0092B-C50C-407E-A947-70E740481C1C}">
+                <a14:useLocalDpi xmlns:a14="http://schemas.microsoft.com/office/drawing/2010/main" val="0"/>
+              </a:ext>
+            </a:extLst>
+          </a:blip>
+          <a:srcRect/>
+          <a:stretch>
+            <a:fillRect/>
+          </a:stretch>
+        </p:blipFill>
+        <p:spPr bwMode="auto">
+          <a:xfrm>
+            <a:off x="5196054" y="3227942"/>
+            <a:ext cx="6995946" cy="3630058"/>
+          </a:xfrm>
+          <a:prstGeom prst="rect">
+            <a:avLst/>
+          </a:prstGeom>
+          <a:noFill/>
+          <a:extLst>
+            <a:ext uri="{909E8E84-426E-40DD-AFC4-6F175D3DCCD1}">
+              <a14:hiddenFill xmlns:a14="http://schemas.microsoft.com/office/drawing/2010/main">
+                <a:solidFill>
+                  <a:srgbClr val="FFFFFF"/>
+                </a:solidFill>
+              </a14:hiddenFill>
+            </a:ext>
+          </a:extLst>
+        </p:spPr>
+      </p:pic>
+      <p:pic>
+        <p:nvPicPr>
+          <p:cNvPr id="1030" name="Picture 6">
+            <a:extLst>
+              <a:ext uri="{FF2B5EF4-FFF2-40B4-BE49-F238E27FC236}">
+                <a16:creationId xmlns:a16="http://schemas.microsoft.com/office/drawing/2014/main" id="{4365EBCE-A944-EA3E-694A-0226129144A0}"/>
+              </a:ext>
+            </a:extLst>
+          </p:cNvPr>
+          <p:cNvPicPr>
+            <a:picLocks noChangeAspect="1" noChangeArrowheads="1"/>
+          </p:cNvPicPr>
+          <p:nvPr/>
+        </p:nvPicPr>
+        <p:blipFill>
+          <a:blip r:embed="rId3">
+            <a:extLst>
+              <a:ext uri="{28A0092B-C50C-407E-A947-70E740481C1C}">
+                <a14:useLocalDpi xmlns:a14="http://schemas.microsoft.com/office/drawing/2010/main" val="0"/>
+              </a:ext>
+            </a:extLst>
+          </a:blip>
+          <a:srcRect/>
+          <a:stretch>
+            <a:fillRect/>
+          </a:stretch>
+        </p:blipFill>
+        <p:spPr bwMode="auto">
+          <a:xfrm>
+            <a:off x="0" y="3040657"/>
+            <a:ext cx="5089793" cy="3817344"/>
+          </a:xfrm>
+          <a:prstGeom prst="rect">
+            <a:avLst/>
+          </a:prstGeom>
+          <a:noFill/>
+          <a:extLst>
+            <a:ext uri="{909E8E84-426E-40DD-AFC4-6F175D3DCCD1}">
+              <a14:hiddenFill xmlns:a14="http://schemas.microsoft.com/office/drawing/2010/main">
+                <a:solidFill>
+                  <a:srgbClr val="FFFFFF"/>
+                </a:solidFill>
+              </a14:hiddenFill>
+            </a:ext>
+          </a:extLst>
+        </p:spPr>
+      </p:pic>
+    </p:spTree>
+    <p:extLst>
+      <p:ext uri="{BB962C8B-B14F-4D97-AF65-F5344CB8AC3E}">
+        <p14:creationId xmlns:p14="http://schemas.microsoft.com/office/powerpoint/2010/main" val="3635306511"/>
+      </p:ext>
+    </p:extLst>
+  </p:cSld>
+  <p:clrMapOvr>
+    <a:masterClrMapping/>
+  </p:clrMapOvr>
+</p:sld>
+</file>
+
+<file path=ppt/slides/slide7.xml><?xml version="1.0" encoding="utf-8"?>
+<p:sld xmlns:a="http://schemas.openxmlformats.org/drawingml/2006/main" xmlns:r="http://schemas.openxmlformats.org/officeDocument/2006/relationships" xmlns:p="http://schemas.openxmlformats.org/presentationml/2006/main">
+  <p:cSld>
+    <p:spTree>
+      <p:nvGrpSpPr>
+        <p:cNvPr id="1" name=""/>
+        <p:cNvGrpSpPr/>
+        <p:nvPr/>
+      </p:nvGrpSpPr>
+      <p:grpSpPr>
+        <a:xfrm>
+          <a:off x="0" y="0"/>
+          <a:ext cx="0" cy="0"/>
+          <a:chOff x="0" y="0"/>
+          <a:chExt cx="0" cy="0"/>
+        </a:xfrm>
+      </p:grpSpPr>
+      <p:sp>
+        <p:nvSpPr>
+          <p:cNvPr id="2" name="Title 1">
+            <a:extLst>
+              <a:ext uri="{FF2B5EF4-FFF2-40B4-BE49-F238E27FC236}">
+                <a16:creationId xmlns:a16="http://schemas.microsoft.com/office/drawing/2014/main" id="{0A43775F-FCD7-863B-D331-153AC34EE6D5}"/>
+              </a:ext>
+            </a:extLst>
+          </p:cNvPr>
+          <p:cNvSpPr>
+            <a:spLocks noGrp="1"/>
+          </p:cNvSpPr>
+          <p:nvPr>
+            <p:ph type="title"/>
+          </p:nvPr>
+        </p:nvSpPr>
+        <p:spPr>
+          <a:xfrm>
+            <a:off x="685800" y="764373"/>
+            <a:ext cx="10820400" cy="1293028"/>
+          </a:xfrm>
+        </p:spPr>
+        <p:txBody>
+          <a:bodyPr/>
+          <a:lstStyle/>
+          <a:p>
+            <a:r>
+              <a:rPr lang="en-US" dirty="0"/>
+              <a:t>Simulation with modified sodar data</a:t>
+            </a:r>
+          </a:p>
+        </p:txBody>
+      </p:sp>
+      <p:sp>
+        <p:nvSpPr>
+          <p:cNvPr id="3" name="Content Placeholder 2">
+            <a:extLst>
+              <a:ext uri="{FF2B5EF4-FFF2-40B4-BE49-F238E27FC236}">
+                <a16:creationId xmlns:a16="http://schemas.microsoft.com/office/drawing/2014/main" id="{D3694422-BE05-0AB6-6244-01C9C630724C}"/>
+              </a:ext>
+            </a:extLst>
+          </p:cNvPr>
+          <p:cNvSpPr>
+            <a:spLocks noGrp="1"/>
+          </p:cNvSpPr>
+          <p:nvPr>
+            <p:ph idx="1"/>
+          </p:nvPr>
+        </p:nvSpPr>
+        <p:spPr/>
+        <p:txBody>
+          <a:bodyPr/>
+          <a:lstStyle/>
+          <a:p>
+            <a:r>
+              <a:rPr lang="en-US" dirty="0"/>
+              <a:t>With the new smoothed out SODAR data, I ran another simulation and this simulation is by far the best simulation we currently have</a:t>
+            </a:r>
+          </a:p>
+          <a:p>
+            <a:r>
+              <a:rPr lang="en-US" dirty="0"/>
+              <a:t>I’m still not satisfied with the 18.89m winds as they still increase with time, but the graph is much smoother, and the change isn’t as drastic as the previous simulations</a:t>
+            </a:r>
+          </a:p>
+        </p:txBody>
+      </p:sp>
+    </p:spTree>
+    <p:extLst>
+      <p:ext uri="{BB962C8B-B14F-4D97-AF65-F5344CB8AC3E}">
+        <p14:creationId xmlns:p14="http://schemas.microsoft.com/office/powerpoint/2010/main" val="4213755830"/>
+      </p:ext>
+    </p:extLst>
+  </p:cSld>
+  <p:clrMapOvr>
+    <a:masterClrMapping/>
+  </p:clrMapOvr>
+</p:sld>
+</file>
+
+<file path=ppt/slides/slide8.xml><?xml version="1.0" encoding="utf-8"?>
+<p:sld xmlns:a="http://schemas.openxmlformats.org/drawingml/2006/main" xmlns:r="http://schemas.openxmlformats.org/officeDocument/2006/relationships" xmlns:p="http://schemas.openxmlformats.org/presentationml/2006/main">
+  <p:cSld>
+    <p:spTree>
+      <p:nvGrpSpPr>
+        <p:cNvPr id="1" name=""/>
+        <p:cNvGrpSpPr/>
+        <p:nvPr/>
+      </p:nvGrpSpPr>
+      <p:grpSpPr>
+        <a:xfrm>
+          <a:off x="0" y="0"/>
+          <a:ext cx="0" cy="0"/>
+          <a:chOff x="0" y="0"/>
+          <a:chExt cx="0" cy="0"/>
+        </a:xfrm>
+      </p:grpSpPr>
+      <p:sp>
+        <p:nvSpPr>
+          <p:cNvPr id="2" name="Title 1">
+            <a:extLst>
+              <a:ext uri="{FF2B5EF4-FFF2-40B4-BE49-F238E27FC236}">
+                <a16:creationId xmlns:a16="http://schemas.microsoft.com/office/drawing/2014/main" id="{D2961721-75F0-A13D-A45E-01087B441497}"/>
+              </a:ext>
+            </a:extLst>
+          </p:cNvPr>
+          <p:cNvSpPr>
+            <a:spLocks noGrp="1"/>
+          </p:cNvSpPr>
+          <p:nvPr>
+            <p:ph type="title"/>
+          </p:nvPr>
+        </p:nvSpPr>
+        <p:spPr>
+          <a:xfrm>
+            <a:off x="980501" y="764373"/>
+            <a:ext cx="10525699" cy="1293028"/>
+          </a:xfrm>
+        </p:spPr>
+        <p:txBody>
+          <a:bodyPr/>
+          <a:lstStyle/>
+          <a:p>
+            <a:r>
+              <a:rPr lang="en-US" dirty="0"/>
+              <a:t>Simulation with modified sodar data</a:t>
+            </a:r>
+          </a:p>
+        </p:txBody>
+      </p:sp>
+      <p:pic>
+        <p:nvPicPr>
+          <p:cNvPr id="3" name="Picture 8">
+            <a:extLst>
+              <a:ext uri="{FF2B5EF4-FFF2-40B4-BE49-F238E27FC236}">
+                <a16:creationId xmlns:a16="http://schemas.microsoft.com/office/drawing/2014/main" id="{9DAE8DA7-879A-EBAA-D42C-AD9FA143940F}"/>
+              </a:ext>
+            </a:extLst>
+          </p:cNvPr>
+          <p:cNvPicPr>
+            <a:picLocks noChangeAspect="1" noChangeArrowheads="1"/>
+          </p:cNvPicPr>
+          <p:nvPr/>
+        </p:nvPicPr>
+        <p:blipFill>
+          <a:blip r:embed="rId2">
+            <a:extLst>
+              <a:ext uri="{28A0092B-C50C-407E-A947-70E740481C1C}">
+                <a14:useLocalDpi xmlns:a14="http://schemas.microsoft.com/office/drawing/2010/main" val="0"/>
+              </a:ext>
+            </a:extLst>
+          </a:blip>
+          <a:srcRect/>
+          <a:stretch>
+            <a:fillRect/>
+          </a:stretch>
+        </p:blipFill>
+        <p:spPr bwMode="auto">
+          <a:xfrm>
+            <a:off x="284600" y="2203372"/>
+            <a:ext cx="5585554" cy="4654628"/>
+          </a:xfrm>
+          <a:prstGeom prst="rect">
+            <a:avLst/>
+          </a:prstGeom>
+          <a:noFill/>
+          <a:extLst>
+            <a:ext uri="{909E8E84-426E-40DD-AFC4-6F175D3DCCD1}">
+              <a14:hiddenFill xmlns:a14="http://schemas.microsoft.com/office/drawing/2010/main">
+                <a:solidFill>
+                  <a:srgbClr val="FFFFFF"/>
+                </a:solidFill>
+              </a14:hiddenFill>
+            </a:ext>
+          </a:extLst>
+        </p:spPr>
+      </p:pic>
+      <p:pic>
+        <p:nvPicPr>
+          <p:cNvPr id="4" name="Picture 2">
+            <a:extLst>
+              <a:ext uri="{FF2B5EF4-FFF2-40B4-BE49-F238E27FC236}">
+                <a16:creationId xmlns:a16="http://schemas.microsoft.com/office/drawing/2014/main" id="{84A63CFE-E691-3302-29FD-FA43F3287507}"/>
+              </a:ext>
+            </a:extLst>
+          </p:cNvPr>
+          <p:cNvPicPr>
+            <a:picLocks noChangeAspect="1" noChangeArrowheads="1"/>
+          </p:cNvPicPr>
+          <p:nvPr/>
+        </p:nvPicPr>
+        <p:blipFill>
+          <a:blip r:embed="rId3">
+            <a:extLst>
+              <a:ext uri="{28A0092B-C50C-407E-A947-70E740481C1C}">
+                <a14:useLocalDpi xmlns:a14="http://schemas.microsoft.com/office/drawing/2010/main" val="0"/>
+              </a:ext>
+            </a:extLst>
+          </a:blip>
+          <a:srcRect/>
+          <a:stretch>
+            <a:fillRect/>
+          </a:stretch>
+        </p:blipFill>
+        <p:spPr bwMode="auto">
+          <a:xfrm>
+            <a:off x="6321848" y="2203373"/>
+            <a:ext cx="5593095" cy="4654627"/>
+          </a:xfrm>
+          <a:prstGeom prst="rect">
+            <a:avLst/>
+          </a:prstGeom>
+          <a:noFill/>
+          <a:extLst>
+            <a:ext uri="{909E8E84-426E-40DD-AFC4-6F175D3DCCD1}">
+              <a14:hiddenFill xmlns:a14="http://schemas.microsoft.com/office/drawing/2010/main">
+                <a:solidFill>
+                  <a:srgbClr val="FFFFFF"/>
+                </a:solidFill>
+              </a14:hiddenFill>
+            </a:ext>
+          </a:extLst>
+        </p:spPr>
+      </p:pic>
+    </p:spTree>
+    <p:extLst>
+      <p:ext uri="{BB962C8B-B14F-4D97-AF65-F5344CB8AC3E}">
+        <p14:creationId xmlns:p14="http://schemas.microsoft.com/office/powerpoint/2010/main" val="28958608"/>
       </p:ext>
     </p:extLst>
   </p:cSld>

</xml_diff>

<commit_message>
Creating LLNL powerpoint and updating
</commit_message>
<xml_diff>
--- a/weekly_meetings/09092022_Presentation.pptx
+++ b/weekly_meetings/09092022_Presentation.pptx
@@ -15,6 +15,8 @@
     <p:sldId id="266" r:id="rId9"/>
     <p:sldId id="267" r:id="rId10"/>
     <p:sldId id="268" r:id="rId11"/>
+    <p:sldId id="269" r:id="rId12"/>
+    <p:sldId id="270" r:id="rId13"/>
   </p:sldIdLst>
   <p:sldSz cx="12192000" cy="6858000"/>
   <p:notesSz cx="6858000" cy="9144000"/>
@@ -7203,6 +7205,316 @@
 </p:sld>
 </file>
 
+<file path=ppt/slides/slide11.xml><?xml version="1.0" encoding="utf-8"?>
+<p:sld xmlns:a="http://schemas.openxmlformats.org/drawingml/2006/main" xmlns:r="http://schemas.openxmlformats.org/officeDocument/2006/relationships" xmlns:p="http://schemas.openxmlformats.org/presentationml/2006/main">
+  <p:cSld>
+    <p:spTree>
+      <p:nvGrpSpPr>
+        <p:cNvPr id="1" name=""/>
+        <p:cNvGrpSpPr/>
+        <p:nvPr/>
+      </p:nvGrpSpPr>
+      <p:grpSpPr>
+        <a:xfrm>
+          <a:off x="0" y="0"/>
+          <a:ext cx="0" cy="0"/>
+          <a:chOff x="0" y="0"/>
+          <a:chExt cx="0" cy="0"/>
+        </a:xfrm>
+      </p:grpSpPr>
+      <p:sp>
+        <p:nvSpPr>
+          <p:cNvPr id="2" name="Title 1">
+            <a:extLst>
+              <a:ext uri="{FF2B5EF4-FFF2-40B4-BE49-F238E27FC236}">
+                <a16:creationId xmlns:a16="http://schemas.microsoft.com/office/drawing/2014/main" id="{B57DE28B-8A0B-E770-6D1A-564ECB75103B}"/>
+              </a:ext>
+            </a:extLst>
+          </p:cNvPr>
+          <p:cNvSpPr>
+            <a:spLocks noGrp="1"/>
+          </p:cNvSpPr>
+          <p:nvPr>
+            <p:ph type="title"/>
+          </p:nvPr>
+        </p:nvSpPr>
+        <p:spPr/>
+        <p:txBody>
+          <a:bodyPr/>
+          <a:lstStyle/>
+          <a:p>
+            <a:r>
+              <a:rPr lang="en-US" dirty="0"/>
+              <a:t>Final ff2 simulation</a:t>
+            </a:r>
+          </a:p>
+        </p:txBody>
+      </p:sp>
+      <p:sp>
+        <p:nvSpPr>
+          <p:cNvPr id="3" name="Content Placeholder 2">
+            <a:extLst>
+              <a:ext uri="{FF2B5EF4-FFF2-40B4-BE49-F238E27FC236}">
+                <a16:creationId xmlns:a16="http://schemas.microsoft.com/office/drawing/2014/main" id="{A4F3D24F-4938-136A-9448-A2644856FD9C}"/>
+              </a:ext>
+            </a:extLst>
+          </p:cNvPr>
+          <p:cNvSpPr>
+            <a:spLocks noGrp="1"/>
+          </p:cNvSpPr>
+          <p:nvPr>
+            <p:ph idx="1"/>
+          </p:nvPr>
+        </p:nvSpPr>
+        <p:spPr/>
+        <p:txBody>
+          <a:bodyPr/>
+          <a:lstStyle/>
+          <a:p>
+            <a:r>
+              <a:rPr lang="en-US" dirty="0"/>
+              <a:t>Currently on Cheyenne, I’m running the final FF2 simulation	</a:t>
+            </a:r>
+          </a:p>
+          <a:p>
+            <a:pPr lvl="1"/>
+            <a:r>
+              <a:rPr lang="en-US" dirty="0"/>
+              <a:t>Over the past few months, tests have been run on a modified version of the FF2 simulation to match initial conditions between the simulation and observations</a:t>
+            </a:r>
+          </a:p>
+          <a:p>
+            <a:pPr lvl="1"/>
+            <a:r>
+              <a:rPr lang="en-US" dirty="0"/>
+              <a:t>Since this run is at 5m, it takes much longer to run, so the run is currently being done on Cheyenne at: /glade/scratch/</a:t>
+            </a:r>
+            <a:r>
+              <a:rPr lang="en-US" dirty="0" err="1"/>
+              <a:t>jbenik</a:t>
+            </a:r>
+            <a:r>
+              <a:rPr lang="en-US" dirty="0"/>
+              <a:t>/FF2_Final_Sim_09_08_22</a:t>
+            </a:r>
+          </a:p>
+          <a:p>
+            <a:pPr lvl="1"/>
+            <a:endParaRPr lang="en-US" dirty="0"/>
+          </a:p>
+        </p:txBody>
+      </p:sp>
+    </p:spTree>
+    <p:extLst>
+      <p:ext uri="{BB962C8B-B14F-4D97-AF65-F5344CB8AC3E}">
+        <p14:creationId xmlns:p14="http://schemas.microsoft.com/office/powerpoint/2010/main" val="1772437016"/>
+      </p:ext>
+    </p:extLst>
+  </p:cSld>
+  <p:clrMapOvr>
+    <a:masterClrMapping/>
+  </p:clrMapOvr>
+</p:sld>
+</file>
+
+<file path=ppt/slides/slide12.xml><?xml version="1.0" encoding="utf-8"?>
+<p:sld xmlns:a="http://schemas.openxmlformats.org/drawingml/2006/main" xmlns:r="http://schemas.openxmlformats.org/officeDocument/2006/relationships" xmlns:p="http://schemas.openxmlformats.org/presentationml/2006/main">
+  <p:cSld>
+    <p:spTree>
+      <p:nvGrpSpPr>
+        <p:cNvPr id="1" name=""/>
+        <p:cNvGrpSpPr/>
+        <p:nvPr/>
+      </p:nvGrpSpPr>
+      <p:grpSpPr>
+        <a:xfrm>
+          <a:off x="0" y="0"/>
+          <a:ext cx="0" cy="0"/>
+          <a:chOff x="0" y="0"/>
+          <a:chExt cx="0" cy="0"/>
+        </a:xfrm>
+      </p:grpSpPr>
+      <p:sp>
+        <p:nvSpPr>
+          <p:cNvPr id="2" name="Title 1">
+            <a:extLst>
+              <a:ext uri="{FF2B5EF4-FFF2-40B4-BE49-F238E27FC236}">
+                <a16:creationId xmlns:a16="http://schemas.microsoft.com/office/drawing/2014/main" id="{914BB80F-DD94-5394-807C-4ACFFAEC3B3C}"/>
+              </a:ext>
+            </a:extLst>
+          </p:cNvPr>
+          <p:cNvSpPr>
+            <a:spLocks noGrp="1"/>
+          </p:cNvSpPr>
+          <p:nvPr>
+            <p:ph type="title"/>
+          </p:nvPr>
+        </p:nvSpPr>
+        <p:spPr/>
+        <p:txBody>
+          <a:bodyPr/>
+          <a:lstStyle/>
+          <a:p>
+            <a:r>
+              <a:rPr lang="en-US" dirty="0"/>
+              <a:t>to do</a:t>
+            </a:r>
+          </a:p>
+        </p:txBody>
+      </p:sp>
+      <p:sp>
+        <p:nvSpPr>
+          <p:cNvPr id="3" name="Content Placeholder 2">
+            <a:extLst>
+              <a:ext uri="{FF2B5EF4-FFF2-40B4-BE49-F238E27FC236}">
+                <a16:creationId xmlns:a16="http://schemas.microsoft.com/office/drawing/2014/main" id="{4742B9AF-A685-B7A6-19DD-1E22F2202D7A}"/>
+              </a:ext>
+            </a:extLst>
+          </p:cNvPr>
+          <p:cNvSpPr>
+            <a:spLocks noGrp="1"/>
+          </p:cNvSpPr>
+          <p:nvPr>
+            <p:ph idx="1"/>
+          </p:nvPr>
+        </p:nvSpPr>
+        <p:spPr/>
+        <p:txBody>
+          <a:bodyPr>
+            <a:normAutofit/>
+          </a:bodyPr>
+          <a:lstStyle/>
+          <a:p>
+            <a:r>
+              <a:rPr lang="en-US" dirty="0"/>
+              <a:t>Read paper about </a:t>
+            </a:r>
+            <a:r>
+              <a:rPr lang="en-US" dirty="0" err="1"/>
+              <a:t>Rothermel</a:t>
+            </a:r>
+            <a:endParaRPr lang="en-US" dirty="0"/>
+          </a:p>
+          <a:p>
+            <a:pPr lvl="1"/>
+            <a:r>
+              <a:rPr lang="en-US" dirty="0"/>
+              <a:t>Working on </a:t>
+            </a:r>
+            <a:r>
+              <a:rPr lang="en-US" dirty="0" err="1"/>
+              <a:t>balbi</a:t>
+            </a:r>
+            <a:r>
+              <a:rPr lang="en-US" dirty="0"/>
+              <a:t> PowerPoint then I will read this</a:t>
+            </a:r>
+          </a:p>
+          <a:p>
+            <a:r>
+              <a:rPr lang="en-US" sz="1900" dirty="0"/>
+              <a:t>Write report on pressure sensors</a:t>
+            </a:r>
+          </a:p>
+          <a:p>
+            <a:pPr lvl="1"/>
+            <a:r>
+              <a:rPr lang="en-US" sz="1900" dirty="0"/>
+              <a:t>In progress</a:t>
+            </a:r>
+            <a:endParaRPr lang="en-US" sz="2100" dirty="0"/>
+          </a:p>
+          <a:p>
+            <a:r>
+              <a:rPr lang="en-US" dirty="0"/>
+              <a:t>Compute ROS with </a:t>
+            </a:r>
+            <a:r>
+              <a:rPr lang="en-US" dirty="0" err="1"/>
+              <a:t>Rothermel</a:t>
+            </a:r>
+            <a:r>
+              <a:rPr lang="en-US" dirty="0"/>
+              <a:t> model</a:t>
+            </a:r>
+          </a:p>
+          <a:p>
+            <a:pPr lvl="1"/>
+            <a:r>
+              <a:rPr lang="en-US" dirty="0"/>
+              <a:t>In progress</a:t>
+            </a:r>
+          </a:p>
+          <a:p>
+            <a:r>
+              <a:rPr lang="en-US" dirty="0"/>
+              <a:t>Compute ROS with </a:t>
+            </a:r>
+            <a:r>
+              <a:rPr lang="en-US" dirty="0" err="1"/>
+              <a:t>Balbi</a:t>
+            </a:r>
+            <a:r>
+              <a:rPr lang="en-US" dirty="0"/>
+              <a:t> model (once that’s implemented)</a:t>
+            </a:r>
+          </a:p>
+          <a:p>
+            <a:r>
+              <a:rPr lang="en-US" dirty="0"/>
+              <a:t>Make </a:t>
+            </a:r>
+            <a:r>
+              <a:rPr lang="en-US" dirty="0" err="1"/>
+              <a:t>powerpoint</a:t>
+            </a:r>
+            <a:r>
+              <a:rPr lang="en-US" dirty="0"/>
+              <a:t> about </a:t>
+            </a:r>
+            <a:r>
+              <a:rPr lang="en-US" dirty="0" err="1"/>
+              <a:t>Balbi</a:t>
+            </a:r>
+            <a:r>
+              <a:rPr lang="en-US" dirty="0"/>
+              <a:t> paper</a:t>
+            </a:r>
+          </a:p>
+          <a:p>
+            <a:pPr lvl="1"/>
+            <a:r>
+              <a:rPr lang="en-US" dirty="0"/>
+              <a:t>In progress</a:t>
+            </a:r>
+          </a:p>
+          <a:p>
+            <a:pPr marL="0" indent="0">
+              <a:buNone/>
+            </a:pPr>
+            <a:endParaRPr lang="en-US" dirty="0"/>
+          </a:p>
+          <a:p>
+            <a:endParaRPr lang="en-US" dirty="0"/>
+          </a:p>
+          <a:p>
+            <a:endParaRPr lang="en-US" dirty="0"/>
+          </a:p>
+        </p:txBody>
+      </p:sp>
+    </p:spTree>
+    <p:extLst>
+      <p:ext uri="{BB962C8B-B14F-4D97-AF65-F5344CB8AC3E}">
+        <p14:creationId xmlns:p14="http://schemas.microsoft.com/office/powerpoint/2010/main" val="1086443755"/>
+      </p:ext>
+    </p:extLst>
+  </p:cSld>
+  <p:clrMapOvr>
+    <a:masterClrMapping/>
+  </p:clrMapOvr>
+</p:sld>
+</file>
+
 <file path=ppt/slides/slide2.xml><?xml version="1.0" encoding="utf-8"?>
 <p:sld xmlns:a="http://schemas.openxmlformats.org/drawingml/2006/main" xmlns:r="http://schemas.openxmlformats.org/officeDocument/2006/relationships" xmlns:p="http://schemas.openxmlformats.org/presentationml/2006/main">
   <p:cSld>
@@ -7267,7 +7579,7 @@
         <p:spPr/>
         <p:txBody>
           <a:bodyPr>
-            <a:normAutofit fontScale="85000" lnSpcReduction="20000"/>
+            <a:normAutofit fontScale="70000" lnSpcReduction="20000"/>
           </a:bodyPr>
           <a:lstStyle/>
           <a:p>
@@ -7282,6 +7594,21 @@
             <a:endParaRPr lang="en-US" dirty="0"/>
           </a:p>
           <a:p>
+            <a:pPr lvl="1"/>
+            <a:r>
+              <a:rPr lang="en-US" dirty="0"/>
+              <a:t>Working on </a:t>
+            </a:r>
+            <a:r>
+              <a:rPr lang="en-US" dirty="0" err="1"/>
+              <a:t>balbi</a:t>
+            </a:r>
+            <a:r>
+              <a:rPr lang="en-US" dirty="0"/>
+              <a:t> PowerPoint then I will read this</a:t>
+            </a:r>
+          </a:p>
+          <a:p>
             <a:r>
               <a:rPr lang="en-US" sz="1900" dirty="0"/>
               <a:t>Write report on pressure sensors</a:t>
@@ -7291,7 +7618,7 @@
             <a:pPr lvl="1"/>
             <a:r>
               <a:rPr lang="en-US" sz="1900" dirty="0"/>
-              <a:t>Waiting for final FF2 simulation before I can write the report</a:t>
+              <a:t>In progress</a:t>
             </a:r>
             <a:endParaRPr lang="en-US" sz="2100" dirty="0"/>
           </a:p>
@@ -7318,7 +7645,7 @@
             <a:pPr lvl="1"/>
             <a:r>
               <a:rPr lang="en-US" dirty="0"/>
-              <a:t>In progress</a:t>
+              <a:t>Done, currently running</a:t>
             </a:r>
           </a:p>
           <a:p>
@@ -7374,10 +7701,16 @@
               <a:t>Balbi</a:t>
             </a:r>
             <a:r>
-              <a:rPr lang="en-US"/>
+              <a:rPr lang="en-US" dirty="0"/>
               <a:t> paper</a:t>
             </a:r>
-            <a:endParaRPr lang="en-US" dirty="0"/>
+          </a:p>
+          <a:p>
+            <a:pPr lvl="1"/>
+            <a:r>
+              <a:rPr lang="en-US" dirty="0"/>
+              <a:t>In progress</a:t>
+            </a:r>
           </a:p>
           <a:p>
             <a:r>
@@ -7398,6 +7731,13 @@
             <a:r>
               <a:rPr lang="en-US" dirty="0"/>
               <a:t>Run a case and change that and see what we get</a:t>
+            </a:r>
+          </a:p>
+          <a:p>
+            <a:pPr lvl="1"/>
+            <a:r>
+              <a:rPr lang="en-US" dirty="0"/>
+              <a:t>Done</a:t>
             </a:r>
           </a:p>
           <a:p>

</xml_diff>